<commit_message>
text shape is ready
</commit_message>
<xml_diff>
--- a/__tests__/test.pptx
+++ b/__tests__/test.pptx
@@ -5,13 +5,15 @@
     <p:sldMasterId id="2147483648" r:id="rId1"/>
   </p:sldMasterIdLst>
   <p:notesMasterIdLst>
-    <p:notesMasterId r:id="rId3"/>
+    <p:notesMasterId r:id="rId5"/>
   </p:notesMasterIdLst>
   <p:handoutMasterIdLst>
-    <p:handoutMasterId r:id="rId4"/>
+    <p:handoutMasterId r:id="rId6"/>
   </p:handoutMasterIdLst>
   <p:sldIdLst>
-    <p:sldId id="257" r:id="rId2"/>
+    <p:sldId id="256" r:id="rId2"/>
+    <p:sldId id="257" r:id="rId3"/>
+    <p:sldId id="258" r:id="rId4"/>
   </p:sldIdLst>
   <p:sldSz cx="12192000" cy="6858000"/>
   <p:notesSz cx="6858000" cy="9144000"/>
@@ -721,7 +723,7 @@
           <a:p>
             <a:fld id="{EE660BAF-C1BD-7A45-A0C9-E34F4587DB3D}" type="slidenum">
               <a:rPr lang="en-US" smtClean="0"/>
-              <a:t>1</a:t>
+              <a:t>2</a:t>
             </a:fld>
             <a:endParaRPr lang="en-US"/>
           </a:p>
@@ -3959,6 +3961,89 @@
           <p:cNvPr id="2" name="Title 1">
             <a:extLst>
               <a:ext uri="{FF2B5EF4-FFF2-40B4-BE49-F238E27FC236}">
+                <a16:creationId xmlns:a16="http://schemas.microsoft.com/office/drawing/2014/main" id="{F766C7A4-FAD7-704D-9C71-D17787E65F57}"/>
+              </a:ext>
+            </a:extLst>
+          </p:cNvPr>
+          <p:cNvSpPr>
+            <a:spLocks noGrp="1"/>
+          </p:cNvSpPr>
+          <p:nvPr>
+            <p:ph type="ctrTitle"/>
+          </p:nvPr>
+        </p:nvSpPr>
+        <p:spPr/>
+        <p:txBody>
+          <a:bodyPr/>
+          <a:lstStyle/>
+          <a:p>
+            <a:r>
+              <a:rPr lang="en-US" dirty="0"/>
+              <a:t>test</a:t>
+            </a:r>
+          </a:p>
+        </p:txBody>
+      </p:sp>
+      <p:sp>
+        <p:nvSpPr>
+          <p:cNvPr id="3" name="Subtitle 2">
+            <a:extLst>
+              <a:ext uri="{FF2B5EF4-FFF2-40B4-BE49-F238E27FC236}">
+                <a16:creationId xmlns:a16="http://schemas.microsoft.com/office/drawing/2014/main" id="{3059E64E-308E-8141-8E77-AE52EB761982}"/>
+              </a:ext>
+            </a:extLst>
+          </p:cNvPr>
+          <p:cNvSpPr>
+            <a:spLocks noGrp="1"/>
+          </p:cNvSpPr>
+          <p:nvPr>
+            <p:ph type="subTitle" idx="1"/>
+          </p:nvPr>
+        </p:nvSpPr>
+        <p:spPr/>
+        <p:txBody>
+          <a:bodyPr/>
+          <a:lstStyle/>
+          <a:p>
+            <a:endParaRPr lang="en-US" dirty="0"/>
+          </a:p>
+        </p:txBody>
+      </p:sp>
+    </p:spTree>
+    <p:extLst>
+      <p:ext uri="{BB962C8B-B14F-4D97-AF65-F5344CB8AC3E}">
+        <p14:creationId xmlns:p14="http://schemas.microsoft.com/office/powerpoint/2010/main" val="369165257"/>
+      </p:ext>
+    </p:extLst>
+  </p:cSld>
+  <p:clrMapOvr>
+    <a:masterClrMapping/>
+  </p:clrMapOvr>
+</p:sld>
+</file>
+
+<file path=ppt/slides/slide2.xml><?xml version="1.0" encoding="utf-8"?>
+<p:sld xmlns:a="http://schemas.openxmlformats.org/drawingml/2006/main" xmlns:r="http://schemas.openxmlformats.org/officeDocument/2006/relationships" xmlns:p="http://schemas.openxmlformats.org/presentationml/2006/main">
+  <p:cSld>
+    <p:spTree>
+      <p:nvGrpSpPr>
+        <p:cNvPr id="1" name=""/>
+        <p:cNvGrpSpPr/>
+        <p:nvPr/>
+      </p:nvGrpSpPr>
+      <p:grpSpPr>
+        <a:xfrm>
+          <a:off x="0" y="0"/>
+          <a:ext cx="0" cy="0"/>
+          <a:chOff x="0" y="0"/>
+          <a:chExt cx="0" cy="0"/>
+        </a:xfrm>
+      </p:grpSpPr>
+      <p:sp>
+        <p:nvSpPr>
+          <p:cNvPr id="2" name="Title 1">
+            <a:extLst>
+              <a:ext uri="{FF2B5EF4-FFF2-40B4-BE49-F238E27FC236}">
                 <a16:creationId xmlns:a16="http://schemas.microsoft.com/office/drawing/2014/main" id="{B3254144-87C0-CE41-876F-51EECCF8C49F}"/>
               </a:ext>
             </a:extLst>
@@ -3979,6 +4064,53 @@
               <a:rPr lang="en-US" dirty="0"/>
               <a:t>hello</a:t>
             </a:r>
+          </a:p>
+        </p:txBody>
+      </p:sp>
+      <p:sp>
+        <p:nvSpPr>
+          <p:cNvPr id="3" name="Content Placeholder 2">
+            <a:extLst>
+              <a:ext uri="{FF2B5EF4-FFF2-40B4-BE49-F238E27FC236}">
+                <a16:creationId xmlns:a16="http://schemas.microsoft.com/office/drawing/2014/main" id="{BA2EF58E-700C-A742-90AF-6839C619B61C}"/>
+              </a:ext>
+            </a:extLst>
+          </p:cNvPr>
+          <p:cNvSpPr>
+            <a:spLocks noGrp="1"/>
+          </p:cNvSpPr>
+          <p:nvPr>
+            <p:ph idx="1"/>
+          </p:nvPr>
+        </p:nvSpPr>
+        <p:spPr/>
+        <p:txBody>
+          <a:bodyPr/>
+          <a:lstStyle/>
+          <a:p>
+            <a:r>
+              <a:rPr lang="en-US" dirty="0"/>
+              <a:t>Good example</a:t>
+            </a:r>
+          </a:p>
+          <a:p>
+            <a:pPr lvl="1"/>
+            <a:endParaRPr lang="en-US" dirty="0"/>
+          </a:p>
+          <a:p>
+            <a:pPr marL="0" indent="0">
+              <a:buNone/>
+            </a:pPr>
+            <a:r>
+              <a:rPr lang="en-US" dirty="0"/>
+              <a:t>Good example text</a:t>
+            </a:r>
+          </a:p>
+          <a:p>
+            <a:pPr marL="0" indent="0">
+              <a:buNone/>
+            </a:pPr>
+            <a:endParaRPr lang="en-US" dirty="0"/>
           </a:p>
         </p:txBody>
       </p:sp>
@@ -3986,6 +4118,90 @@
     <p:extLst>
       <p:ext uri="{BB962C8B-B14F-4D97-AF65-F5344CB8AC3E}">
         <p14:creationId xmlns:p14="http://schemas.microsoft.com/office/powerpoint/2010/main" val="970788332"/>
+      </p:ext>
+    </p:extLst>
+  </p:cSld>
+  <p:clrMapOvr>
+    <a:masterClrMapping/>
+  </p:clrMapOvr>
+</p:sld>
+</file>
+
+<file path=ppt/slides/slide3.xml><?xml version="1.0" encoding="utf-8"?>
+<p:sld xmlns:a="http://schemas.openxmlformats.org/drawingml/2006/main" xmlns:r="http://schemas.openxmlformats.org/officeDocument/2006/relationships" xmlns:p="http://schemas.openxmlformats.org/presentationml/2006/main">
+  <p:cSld>
+    <p:spTree>
+      <p:nvGrpSpPr>
+        <p:cNvPr id="1" name=""/>
+        <p:cNvGrpSpPr/>
+        <p:nvPr/>
+      </p:nvGrpSpPr>
+      <p:grpSpPr>
+        <a:xfrm>
+          <a:off x="0" y="0"/>
+          <a:ext cx="0" cy="0"/>
+          <a:chOff x="0" y="0"/>
+          <a:chExt cx="0" cy="0"/>
+        </a:xfrm>
+      </p:grpSpPr>
+      <p:sp>
+        <p:nvSpPr>
+          <p:cNvPr id="2" name="Title 1">
+            <a:extLst>
+              <a:ext uri="{FF2B5EF4-FFF2-40B4-BE49-F238E27FC236}">
+                <a16:creationId xmlns:a16="http://schemas.microsoft.com/office/drawing/2014/main" id="{48CB073E-7FC7-444D-8CE0-90200C870596}"/>
+              </a:ext>
+            </a:extLst>
+          </p:cNvPr>
+          <p:cNvSpPr>
+            <a:spLocks noGrp="1"/>
+          </p:cNvSpPr>
+          <p:nvPr>
+            <p:ph type="title"/>
+          </p:nvPr>
+        </p:nvSpPr>
+        <p:spPr/>
+        <p:txBody>
+          <a:bodyPr/>
+          <a:lstStyle/>
+          <a:p>
+            <a:endParaRPr lang="en-US"/>
+          </a:p>
+        </p:txBody>
+      </p:sp>
+      <p:pic>
+        <p:nvPicPr>
+          <p:cNvPr id="5" name="Content Placeholder 4">
+            <a:extLst>
+              <a:ext uri="{FF2B5EF4-FFF2-40B4-BE49-F238E27FC236}">
+                <a16:creationId xmlns:a16="http://schemas.microsoft.com/office/drawing/2014/main" id="{F59EF872-908B-234F-8AD5-3304AF529530}"/>
+              </a:ext>
+            </a:extLst>
+          </p:cNvPr>
+          <p:cNvPicPr>
+            <a:picLocks noGrp="1" noChangeAspect="1"/>
+          </p:cNvPicPr>
+          <p:nvPr>
+            <p:ph idx="1"/>
+          </p:nvPr>
+        </p:nvPicPr>
+        <p:blipFill>
+          <a:blip r:embed="rId2"/>
+          <a:stretch>
+            <a:fillRect/>
+          </a:stretch>
+        </p:blipFill>
+        <p:spPr>
+          <a:xfrm>
+            <a:off x="4610100" y="2375694"/>
+            <a:ext cx="2971800" cy="3251200"/>
+          </a:xfrm>
+        </p:spPr>
+      </p:pic>
+    </p:spTree>
+    <p:extLst>
+      <p:ext uri="{BB962C8B-B14F-4D97-AF65-F5344CB8AC3E}">
+        <p14:creationId xmlns:p14="http://schemas.microsoft.com/office/powerpoint/2010/main" val="112712866"/>
       </p:ext>
     </p:extLst>
   </p:cSld>

</xml_diff>